<commit_message>
Correct pie chart labels.
</commit_message>
<xml_diff>
--- a/renders/Diagrams.pptx
+++ b/renders/Diagrams.pptx
@@ -425,8 +425,8 @@
               <c:idx val="0"/>
               <c:layout>
                 <c:manualLayout>
-                  <c:x val="0.22143036287099122"/>
-                  <c:y val="0"/>
+                  <c:x val="0.20330992409732568"/>
+                  <c:y val="9.5571984643673022E-4"/>
                 </c:manualLayout>
               </c:layout>
               <c:tx>
@@ -435,15 +435,15 @@
                   <a:lstStyle/>
                   <a:p>
                     <a:r>
-                      <a:rPr lang="en-US" altLang="en-US"/>
+                      <a:rPr lang="en-US" altLang="ja-JP"/>
                       <a:t>Vertex Shader
 </a:t>
                     </a:r>
                     <a:r>
-                      <a:rPr lang="en-US" altLang="en-US" sz="2000" b="1"/>
-                      <a:t>7%</a:t>
+                      <a:rPr lang="en-US" altLang="ja-JP" sz="2000" b="1"/>
+                      <a:t>1%</a:t>
                     </a:r>
-                    <a:endParaRPr lang="en-US" altLang="en-US" b="1"/>
+                    <a:endParaRPr lang="en-US" altLang="ja-JP" b="1"/>
                   </a:p>
                 </c:rich>
               </c:tx>
@@ -458,8 +458,8 @@
               <c:idx val="1"/>
               <c:layout>
                 <c:manualLayout>
-                  <c:x val="0.29838873452128734"/>
-                  <c:y val="7.6461586411232157E-2"/>
+                  <c:x val="0.30415691281833013"/>
+                  <c:y val="7.9114554573245358E-2"/>
                 </c:manualLayout>
               </c:layout>
               <c:tx>
@@ -468,14 +468,15 @@
                   <a:lstStyle/>
                   <a:p>
                     <a:r>
-                      <a:rPr lang="en-US" altLang="en-US"/>
+                      <a:rPr lang="en-US" altLang="ja-JP"/>
                       <a:t>Primitive Assembly
 </a:t>
                     </a:r>
                     <a:r>
-                      <a:rPr lang="en-US" altLang="en-US" sz="2000" b="1"/>
-                      <a:t>20%</a:t>
+                      <a:rPr lang="en-US" altLang="ja-JP" sz="2000" b="1"/>
+                      <a:t>1%</a:t>
                     </a:r>
+                    <a:endParaRPr lang="en-US" altLang="ja-JP" b="1"/>
                   </a:p>
                 </c:rich>
               </c:tx>
@@ -490,8 +491,8 @@
               <c:idx val="2"/>
               <c:layout>
                 <c:manualLayout>
-                  <c:x val="-0.18331412403755418"/>
-                  <c:y val="-0.22578583461516713"/>
+                  <c:x val="-0.17660042916932681"/>
+                  <c:y val="-0.21598786837909476"/>
                 </c:manualLayout>
               </c:layout>
               <c:tx>
@@ -500,14 +501,15 @@
                   <a:lstStyle/>
                   <a:p>
                     <a:r>
-                      <a:rPr lang="en-US" altLang="en-US"/>
+                      <a:rPr lang="en-US" altLang="ja-JP"/>
                       <a:t>Rasterization
 </a:t>
                     </a:r>
                     <a:r>
-                      <a:rPr lang="en-US" altLang="en-US" sz="2000" b="1"/>
-                      <a:t>21%</a:t>
+                      <a:rPr lang="en-US" altLang="ja-JP" sz="2000" b="1"/>
+                      <a:t>72%</a:t>
                     </a:r>
+                    <a:endParaRPr lang="en-US" altLang="ja-JP" b="1"/>
                   </a:p>
                 </c:rich>
               </c:tx>
@@ -522,8 +524,8 @@
               <c:idx val="3"/>
               <c:layout>
                 <c:manualLayout>
-                  <c:x val="0.1592352820885527"/>
-                  <c:y val="0.14283741671733363"/>
+                  <c:x val="0.17136101652833935"/>
+                  <c:y val="0.14451009559825873"/>
                 </c:manualLayout>
               </c:layout>
               <c:tx>
@@ -532,13 +534,17 @@
                   <a:lstStyle/>
                   <a:p>
                     <a:r>
-                      <a:rPr lang="en-US" altLang="en-US"/>
-                      <a:t>Fragment Shader
+                      <a:rPr lang="en-US" altLang="ja-JP" sz="1200" b="0"/>
+                      <a:t>Fragment Shader</a:t>
+                    </a:r>
+                    <a:r>
+                      <a:rPr lang="en-US" altLang="ja-JP" sz="1200"/>
+                      <a:t>
 </a:t>
                     </a:r>
                     <a:r>
-                      <a:rPr lang="en-US" altLang="en-US" sz="2000" b="1"/>
-                      <a:t>33%</a:t>
+                      <a:rPr lang="en-US" altLang="ja-JP" sz="2000" b="1"/>
+                      <a:t>20%</a:t>
                     </a:r>
                   </a:p>
                 </c:rich>
@@ -554,8 +560,8 @@
               <c:idx val="4"/>
               <c:layout>
                 <c:manualLayout>
-                  <c:x val="-0.19650464460799694"/>
-                  <c:y val="2.6211656219849153E-3"/>
+                  <c:x val="-0.14304320068099596"/>
+                  <c:y val="1.5771895399363908E-2"/>
                 </c:manualLayout>
               </c:layout>
               <c:tx>
@@ -564,15 +570,15 @@
                   <a:lstStyle/>
                   <a:p>
                     <a:r>
-                      <a:rPr lang="en-US" altLang="en-US"/>
+                      <a:rPr lang="en-US" altLang="ja-JP"/>
                       <a:t>Fragments to Framebuffer
 </a:t>
                     </a:r>
                     <a:r>
-                      <a:rPr lang="en-US" altLang="en-US" sz="2000" b="1"/>
-                      <a:t>19%</a:t>
+                      <a:rPr lang="en-US" altLang="ja-JP" sz="2000" b="1"/>
+                      <a:t>6%</a:t>
                     </a:r>
-                    <a:endParaRPr lang="en-US" altLang="en-US" b="1"/>
+                    <a:endParaRPr lang="en-US" altLang="ja-JP" b="1"/>
                   </a:p>
                 </c:rich>
               </c:tx>
@@ -764,22 +770,22 @@
 <c:userShapes xmlns:c="http://schemas.openxmlformats.org/drawingml/2006/chart">
   <cdr:relSizeAnchor xmlns:cdr="http://schemas.openxmlformats.org/drawingml/2006/chartDrawing">
     <cdr:from>
-      <cdr:x>0.50168</cdr:x>
-      <cdr:y>0.06313</cdr:y>
+      <cdr:x>0.5</cdr:x>
+      <cdr:y>0.06188</cdr:y>
     </cdr:from>
     <cdr:to>
-      <cdr:x>0.55724</cdr:x>
-      <cdr:y>0.06313</cdr:y>
+      <cdr:x>0.55575</cdr:x>
+      <cdr:y>0.06188</cdr:y>
     </cdr:to>
     <cdr:cxnSp macro="">
       <cdr:nvCxnSpPr>
-        <cdr:cNvPr id="3" name="Straight Arrow Connector 2"/>
+        <cdr:cNvPr id="2" name="Straight Arrow Connector 1"/>
         <cdr:cNvCxnSpPr/>
       </cdr:nvCxnSpPr>
       <cdr:spPr>
         <a:xfrm xmlns:a="http://schemas.openxmlformats.org/drawingml/2006/main">
-          <a:off x="2838431" y="288032"/>
-          <a:ext cx="314350" cy="0"/>
+          <a:off x="2819400" y="282639"/>
+          <a:ext cx="314363" cy="0"/>
         </a:xfrm>
         <a:prstGeom xmlns:a="http://schemas.openxmlformats.org/drawingml/2006/main" prst="straightConnector1">
           <a:avLst/>
@@ -807,22 +813,22 @@
   </cdr:relSizeAnchor>
   <cdr:relSizeAnchor xmlns:cdr="http://schemas.openxmlformats.org/drawingml/2006/chartDrawing">
     <cdr:from>
-      <cdr:x>0.5</cdr:x>
-      <cdr:y>0.06313</cdr:y>
+      <cdr:x>0.49831</cdr:x>
+      <cdr:y>0.0577</cdr:y>
     </cdr:from>
     <cdr:to>
       <cdr:x>0.5</cdr:x>
-      <cdr:y>0.5018</cdr:y>
+      <cdr:y>0.50334</cdr:y>
     </cdr:to>
     <cdr:cxnSp macro="">
       <cdr:nvCxnSpPr>
-        <cdr:cNvPr id="6" name="Straight Connector 5"/>
+        <cdr:cNvPr id="3" name="Straight Connector 2"/>
         <cdr:cNvCxnSpPr/>
       </cdr:nvCxnSpPr>
       <cdr:spPr>
-        <a:xfrm xmlns:a="http://schemas.openxmlformats.org/drawingml/2006/main" flipV="1">
-          <a:off x="2828926" y="288032"/>
-          <a:ext cx="0" cy="2001399"/>
+        <a:xfrm xmlns:a="http://schemas.openxmlformats.org/drawingml/2006/main" flipH="1" flipV="1">
+          <a:off x="2809871" y="263548"/>
+          <a:ext cx="9529" cy="2035315"/>
         </a:xfrm>
         <a:prstGeom xmlns:a="http://schemas.openxmlformats.org/drawingml/2006/main" prst="line">
           <a:avLst/>
@@ -1029,7 +1035,7 @@
           <a:p>
             <a:fld id="{504DD8F6-EE2D-4D11-8EDE-587B0F2AAC5A}" type="datetimeFigureOut">
               <a:rPr kumimoji="1" lang="ja-JP" altLang="en-US" smtClean="0"/>
-              <a:t>2013/11/1</a:t>
+              <a:t>2013/11/6</a:t>
             </a:fld>
             <a:endParaRPr kumimoji="1" lang="ja-JP" altLang="en-US"/>
           </a:p>
@@ -1199,7 +1205,7 @@
           <a:p>
             <a:fld id="{504DD8F6-EE2D-4D11-8EDE-587B0F2AAC5A}" type="datetimeFigureOut">
               <a:rPr kumimoji="1" lang="ja-JP" altLang="en-US" smtClean="0"/>
-              <a:t>2013/11/1</a:t>
+              <a:t>2013/11/6</a:t>
             </a:fld>
             <a:endParaRPr kumimoji="1" lang="ja-JP" altLang="en-US"/>
           </a:p>
@@ -1379,7 +1385,7 @@
           <a:p>
             <a:fld id="{504DD8F6-EE2D-4D11-8EDE-587B0F2AAC5A}" type="datetimeFigureOut">
               <a:rPr kumimoji="1" lang="ja-JP" altLang="en-US" smtClean="0"/>
-              <a:t>2013/11/1</a:t>
+              <a:t>2013/11/6</a:t>
             </a:fld>
             <a:endParaRPr kumimoji="1" lang="ja-JP" altLang="en-US"/>
           </a:p>
@@ -1549,7 +1555,7 @@
           <a:p>
             <a:fld id="{504DD8F6-EE2D-4D11-8EDE-587B0F2AAC5A}" type="datetimeFigureOut">
               <a:rPr kumimoji="1" lang="ja-JP" altLang="en-US" smtClean="0"/>
-              <a:t>2013/11/1</a:t>
+              <a:t>2013/11/6</a:t>
             </a:fld>
             <a:endParaRPr kumimoji="1" lang="ja-JP" altLang="en-US"/>
           </a:p>
@@ -1795,7 +1801,7 @@
           <a:p>
             <a:fld id="{504DD8F6-EE2D-4D11-8EDE-587B0F2AAC5A}" type="datetimeFigureOut">
               <a:rPr kumimoji="1" lang="ja-JP" altLang="en-US" smtClean="0"/>
-              <a:t>2013/11/1</a:t>
+              <a:t>2013/11/6</a:t>
             </a:fld>
             <a:endParaRPr kumimoji="1" lang="ja-JP" altLang="en-US"/>
           </a:p>
@@ -2083,7 +2089,7 @@
           <a:p>
             <a:fld id="{504DD8F6-EE2D-4D11-8EDE-587B0F2AAC5A}" type="datetimeFigureOut">
               <a:rPr kumimoji="1" lang="ja-JP" altLang="en-US" smtClean="0"/>
-              <a:t>2013/11/1</a:t>
+              <a:t>2013/11/6</a:t>
             </a:fld>
             <a:endParaRPr kumimoji="1" lang="ja-JP" altLang="en-US"/>
           </a:p>
@@ -2505,7 +2511,7 @@
           <a:p>
             <a:fld id="{504DD8F6-EE2D-4D11-8EDE-587B0F2AAC5A}" type="datetimeFigureOut">
               <a:rPr kumimoji="1" lang="ja-JP" altLang="en-US" smtClean="0"/>
-              <a:t>2013/11/1</a:t>
+              <a:t>2013/11/6</a:t>
             </a:fld>
             <a:endParaRPr kumimoji="1" lang="ja-JP" altLang="en-US"/>
           </a:p>
@@ -2623,7 +2629,7 @@
           <a:p>
             <a:fld id="{504DD8F6-EE2D-4D11-8EDE-587B0F2AAC5A}" type="datetimeFigureOut">
               <a:rPr kumimoji="1" lang="ja-JP" altLang="en-US" smtClean="0"/>
-              <a:t>2013/11/1</a:t>
+              <a:t>2013/11/6</a:t>
             </a:fld>
             <a:endParaRPr kumimoji="1" lang="ja-JP" altLang="en-US"/>
           </a:p>
@@ -2718,7 +2724,7 @@
           <a:p>
             <a:fld id="{504DD8F6-EE2D-4D11-8EDE-587B0F2AAC5A}" type="datetimeFigureOut">
               <a:rPr kumimoji="1" lang="ja-JP" altLang="en-US" smtClean="0"/>
-              <a:t>2013/11/1</a:t>
+              <a:t>2013/11/6</a:t>
             </a:fld>
             <a:endParaRPr kumimoji="1" lang="ja-JP" altLang="en-US"/>
           </a:p>
@@ -2995,7 +3001,7 @@
           <a:p>
             <a:fld id="{504DD8F6-EE2D-4D11-8EDE-587B0F2AAC5A}" type="datetimeFigureOut">
               <a:rPr kumimoji="1" lang="ja-JP" altLang="en-US" smtClean="0"/>
-              <a:t>2013/11/1</a:t>
+              <a:t>2013/11/6</a:t>
             </a:fld>
             <a:endParaRPr kumimoji="1" lang="ja-JP" altLang="en-US"/>
           </a:p>
@@ -3248,7 +3254,7 @@
           <a:p>
             <a:fld id="{504DD8F6-EE2D-4D11-8EDE-587B0F2AAC5A}" type="datetimeFigureOut">
               <a:rPr kumimoji="1" lang="ja-JP" altLang="en-US" smtClean="0"/>
-              <a:t>2013/11/1</a:t>
+              <a:t>2013/11/6</a:t>
             </a:fld>
             <a:endParaRPr kumimoji="1" lang="ja-JP" altLang="en-US"/>
           </a:p>
@@ -3461,7 +3467,7 @@
           <a:p>
             <a:fld id="{504DD8F6-EE2D-4D11-8EDE-587B0F2AAC5A}" type="datetimeFigureOut">
               <a:rPr kumimoji="1" lang="ja-JP" altLang="en-US" smtClean="0"/>
-              <a:t>2013/11/1</a:t>
+              <a:t>2013/11/6</a:t>
             </a:fld>
             <a:endParaRPr kumimoji="1" lang="ja-JP" altLang="en-US"/>
           </a:p>
@@ -3860,30 +3866,6 @@
           </a:graphicData>
         </a:graphic>
       </p:graphicFrame>
-      <p:graphicFrame>
-        <p:nvGraphicFramePr>
-          <p:cNvPr id="6" name="Chart 5"/>
-          <p:cNvGraphicFramePr>
-            <a:graphicFrameLocks/>
-          </p:cNvGraphicFramePr>
-          <p:nvPr>
-            <p:extLst>
-              <p:ext uri="{D42A27DB-BD31-4B8C-83A1-F6EECF244321}">
-                <p14:modId xmlns:p14="http://schemas.microsoft.com/office/powerpoint/2010/main" val="2564119075"/>
-              </p:ext>
-            </p:extLst>
-          </p:nvPr>
-        </p:nvGraphicFramePr>
-        <p:xfrm>
-          <a:off x="3707904" y="1628800"/>
-          <a:ext cx="5657851" cy="4562474"/>
-        </p:xfrm>
-        <a:graphic>
-          <a:graphicData uri="http://schemas.openxmlformats.org/drawingml/2006/chart">
-            <c:chart xmlns:c="http://schemas.openxmlformats.org/drawingml/2006/chart" xmlns:r="http://schemas.openxmlformats.org/officeDocument/2006/relationships" r:id="rId3"/>
-          </a:graphicData>
-        </a:graphic>
-      </p:graphicFrame>
       <p:pic>
         <p:nvPicPr>
           <p:cNvPr id="1026" name="Picture 2" descr="C:\Users\Takashi\Documents\GitHub\Project4-Rasterizer\renders\4.png"/>
@@ -3893,7 +3875,7 @@
           <p:nvPr/>
         </p:nvPicPr>
         <p:blipFill>
-          <a:blip r:embed="rId4" cstate="print">
+          <a:blip r:embed="rId3" cstate="print">
             <a:extLst>
               <a:ext uri="{28A0092B-C50C-407E-A947-70E740481C1C}">
                 <a14:useLocalDpi xmlns:a14="http://schemas.microsoft.com/office/drawing/2010/main" val="0"/>
@@ -3934,7 +3916,7 @@
           <p:nvPr/>
         </p:nvPicPr>
         <p:blipFill>
-          <a:blip r:embed="rId5" cstate="print">
+          <a:blip r:embed="rId4" cstate="print">
             <a:extLst>
               <a:ext uri="{28A0092B-C50C-407E-A947-70E740481C1C}">
                 <a14:useLocalDpi xmlns:a14="http://schemas.microsoft.com/office/drawing/2010/main" val="0"/>
@@ -3966,6 +3948,30 @@
           </a:extLst>
         </p:spPr>
       </p:pic>
+      <p:graphicFrame>
+        <p:nvGraphicFramePr>
+          <p:cNvPr id="7" name="Chart 6"/>
+          <p:cNvGraphicFramePr>
+            <a:graphicFrameLocks/>
+          </p:cNvGraphicFramePr>
+          <p:nvPr>
+            <p:extLst>
+              <p:ext uri="{D42A27DB-BD31-4B8C-83A1-F6EECF244321}">
+                <p14:modId xmlns:p14="http://schemas.microsoft.com/office/powerpoint/2010/main" val="2952292966"/>
+              </p:ext>
+            </p:extLst>
+          </p:nvPr>
+        </p:nvGraphicFramePr>
+        <p:xfrm>
+          <a:off x="3779912" y="1628800"/>
+          <a:ext cx="5638800" cy="4567238"/>
+        </p:xfrm>
+        <a:graphic>
+          <a:graphicData uri="http://schemas.openxmlformats.org/drawingml/2006/chart">
+            <c:chart xmlns:c="http://schemas.openxmlformats.org/drawingml/2006/chart" xmlns:r="http://schemas.openxmlformats.org/officeDocument/2006/relationships" r:id="rId5"/>
+          </a:graphicData>
+        </a:graphic>
+      </p:graphicFrame>
     </p:spTree>
     <p:extLst>
       <p:ext uri="{BB962C8B-B14F-4D97-AF65-F5344CB8AC3E}">

</xml_diff>